<commit_message>
added missing example.org namespace
</commit_message>
<xml_diff>
--- a/2017-fall/constituents-address-figure.pptx
+++ b/2017-fall/constituents-address-figure.pptx
@@ -3079,21 +3079,8 @@
                   <a:schemeClr val="accent5"/>
                 </a:solidFill>
               </a:rPr>
-              <a:t>a </a:t>
-            </a:r>
-            <a:r>
-              <a:rPr lang="en-US" sz="1600" smtClean="0">
-                <a:solidFill>
-                  <a:schemeClr val="accent5"/>
-                </a:solidFill>
-              </a:rPr>
-              <a:t>dcterms:Agent</a:t>
-            </a:r>
-            <a:endParaRPr lang="en-US" sz="1600" smtClean="0">
-              <a:solidFill>
-                <a:schemeClr val="accent5"/>
-              </a:solidFill>
-            </a:endParaRPr>
+              <a:t>a dcterms:Agent</a:t>
+            </a:r>
           </a:p>
         </p:txBody>
       </p:sp>
@@ -3171,21 +3158,8 @@
                   <a:schemeClr val="accent5"/>
                 </a:solidFill>
               </a:rPr>
-              <a:t>a </a:t>
-            </a:r>
-            <a:r>
-              <a:rPr lang="en-US" sz="1600" smtClean="0">
-                <a:solidFill>
-                  <a:schemeClr val="accent5"/>
-                </a:solidFill>
-              </a:rPr>
-              <a:t>dcterms:Location</a:t>
-            </a:r>
-            <a:endParaRPr lang="en-US" sz="1600" smtClean="0">
-              <a:solidFill>
-                <a:schemeClr val="accent5"/>
-              </a:solidFill>
-            </a:endParaRPr>
+              <a:t>a dcterms:Location</a:t>
+            </a:r>
           </a:p>
         </p:txBody>
       </p:sp>
@@ -3213,17 +3187,8 @@
           <a:p>
             <a:r>
               <a:rPr lang="en-US"/>
-              <a:t>http</a:t>
-            </a:r>
-            <a:r>
-              <a:rPr lang="en-US"/>
-              <a:t>://</a:t>
-            </a:r>
-            <a:r>
-              <a:rPr lang="en-US"/>
-              <a:t>pic.nypl.org/addresses/111300</a:t>
-            </a:r>
-            <a:endParaRPr lang="en-US"/>
+              <a:t>http://pic.nypl.org/addresses/111300</a:t>
+            </a:r>
           </a:p>
         </p:txBody>
       </p:sp>
@@ -3296,11 +3261,6 @@
               </a:rPr>
               <a:t>ex:hasConstituent</a:t>
             </a:r>
-            <a:endParaRPr lang="en-US" smtClean="0">
-              <a:solidFill>
-                <a:schemeClr val="accent5"/>
-              </a:solidFill>
-            </a:endParaRPr>
           </a:p>
         </p:txBody>
       </p:sp>
@@ -3328,21 +3288,8 @@
           <a:p>
             <a:r>
               <a:rPr lang="en-US" smtClean="0"/>
-              <a:t>Constituent</a:t>
-            </a:r>
-            <a:r>
-              <a:rPr lang="en-US" smtClean="0"/>
-              <a:t> </a:t>
-            </a:r>
-            <a:r>
-              <a:rPr lang="en-US" smtClean="0"/>
-              <a:t>datatype </a:t>
-            </a:r>
-            <a:r>
-              <a:rPr lang="en-US" smtClean="0"/>
-              <a:t>properties (= example):</a:t>
-            </a:r>
-            <a:endParaRPr lang="en-US" smtClean="0"/>
+              <a:t>Constituent datatype properties (= example):</a:t>
+            </a:r>
           </a:p>
           <a:p>
             <a:r>
@@ -3415,10 +3362,6 @@
               </a:rPr>
               <a:t>gvp:estEnd = (datatyped xsd:gYear) 1987</a:t>
             </a:r>
-            <a:endParaRPr lang="en-US" sz="1200">
-              <a:latin typeface="Courier New" panose="02070309020205020404" pitchFamily="49" charset="0"/>
-              <a:cs typeface="Courier New" panose="02070309020205020404" pitchFamily="49" charset="0"/>
-            </a:endParaRPr>
           </a:p>
         </p:txBody>
       </p:sp>
@@ -3512,8 +3455,8 @@
         </p:nvSpPr>
         <p:spPr>
           <a:xfrm>
-            <a:off x="4687182" y="5177975"/>
-            <a:ext cx="4461478" cy="1661993"/>
+            <a:off x="4649803" y="5012038"/>
+            <a:ext cx="4461478" cy="1846659"/>
           </a:xfrm>
           <a:prstGeom prst="rect">
             <a:avLst/>
@@ -3528,13 +3471,8 @@
           <a:p>
             <a:r>
               <a:rPr lang="en-US" smtClean="0"/>
-              <a:t>Namespace abbreviations</a:t>
-            </a:r>
-            <a:r>
-              <a:rPr lang="en-US" smtClean="0"/>
-              <a:t>:</a:t>
-            </a:r>
-            <a:endParaRPr lang="en-US" smtClean="0"/>
+              <a:t>Namespace abbreviations:</a:t>
+            </a:r>
           </a:p>
           <a:p>
             <a:r>
@@ -3596,7 +3534,23 @@
                 <a:latin typeface="Courier New" panose="02070309020205020404" pitchFamily="49" charset="0"/>
                 <a:cs typeface="Courier New" panose="02070309020205020404" pitchFamily="49" charset="0"/>
               </a:rPr>
-              <a:t>geo = http://www.w3.org/2003/01/geo/wgs84_pos#</a:t>
+              <a:t>geo = http://www.w3.org/2003/01/geo/wgs84_pos</a:t>
+            </a:r>
+            <a:r>
+              <a:rPr lang="en-US" sz="1200" smtClean="0">
+                <a:latin typeface="Courier New" panose="02070309020205020404" pitchFamily="49" charset="0"/>
+                <a:cs typeface="Courier New" panose="02070309020205020404" pitchFamily="49" charset="0"/>
+              </a:rPr>
+              <a:t>#</a:t>
+            </a:r>
+          </a:p>
+          <a:p>
+            <a:r>
+              <a:rPr lang="en-US" sz="1200" smtClean="0">
+                <a:latin typeface="Courier New" panose="02070309020205020404" pitchFamily="49" charset="0"/>
+                <a:cs typeface="Courier New" panose="02070309020205020404" pitchFamily="49" charset="0"/>
+              </a:rPr>
+              <a:t>ex = http://example.org/</a:t>
             </a:r>
             <a:endParaRPr lang="en-US" sz="1200" smtClean="0">
               <a:latin typeface="Courier New" panose="02070309020205020404" pitchFamily="49" charset="0"/>
@@ -3720,11 +3674,6 @@
               </a:rPr>
               <a:t>grid:cityName</a:t>
             </a:r>
-            <a:endParaRPr lang="en-US" smtClean="0">
-              <a:solidFill>
-                <a:schemeClr val="accent5"/>
-              </a:solidFill>
-            </a:endParaRPr>
           </a:p>
         </p:txBody>
       </p:sp>
@@ -3752,11 +3701,7 @@
           <a:p>
             <a:r>
               <a:rPr lang="en-US"/>
-              <a:t>"</a:t>
-            </a:r>
-            <a:r>
-              <a:rPr lang="en-US"/>
-              <a:t>Pittsburgh</a:t>
+              <a:t>"Pittsburgh</a:t>
             </a:r>
             <a:r>
               <a:rPr lang="en-US" smtClean="0"/>
@@ -4075,11 +4020,6 @@
               </a:rPr>
               <a:t>grid:establishedYear</a:t>
             </a:r>
-            <a:endParaRPr lang="en-US" smtClean="0">
-              <a:solidFill>
-                <a:schemeClr val="accent5"/>
-              </a:solidFill>
-            </a:endParaRPr>
           </a:p>
         </p:txBody>
       </p:sp>

</xml_diff>